<commit_message>
Add illustration for ServletRequestListener
</commit_message>
<xml_diff>
--- a/spring-mvc-common-processing.pptx
+++ b/spring-mvc-common-processing.pptx
@@ -232,7 +232,7 @@
           <a:p>
             <a:fld id="{9E504720-E6DD-564E-A9E4-6973BED6C95B}" type="datetimeFigureOut">
               <a:rPr kumimoji="1" lang="ja-JP" altLang="en-US" smtClean="0"/>
-              <a:t>2016/5/13</a:t>
+              <a:t>2016/5/14</a:t>
             </a:fld>
             <a:endParaRPr kumimoji="1" lang="ja-JP" altLang="en-US"/>
           </a:p>
@@ -1335,7 +1335,7 @@
           <a:p>
             <a:fld id="{2D836C50-4024-0240-9768-AF72A8EA574D}" type="datetimeFigureOut">
               <a:rPr kumimoji="1" lang="ja-JP" altLang="en-US" smtClean="0"/>
-              <a:t>2016/5/13</a:t>
+              <a:t>2016/5/14</a:t>
             </a:fld>
             <a:endParaRPr kumimoji="1" lang="ja-JP" altLang="en-US"/>
           </a:p>
@@ -1537,7 +1537,7 @@
           <a:p>
             <a:fld id="{2D836C50-4024-0240-9768-AF72A8EA574D}" type="datetimeFigureOut">
               <a:rPr kumimoji="1" lang="ja-JP" altLang="en-US" smtClean="0"/>
-              <a:t>2016/5/13</a:t>
+              <a:t>2016/5/14</a:t>
             </a:fld>
             <a:endParaRPr kumimoji="1" lang="ja-JP" altLang="en-US"/>
           </a:p>
@@ -1749,7 +1749,7 @@
           <a:p>
             <a:fld id="{2D836C50-4024-0240-9768-AF72A8EA574D}" type="datetimeFigureOut">
               <a:rPr kumimoji="1" lang="ja-JP" altLang="en-US" smtClean="0"/>
-              <a:t>2016/5/13</a:t>
+              <a:t>2016/5/14</a:t>
             </a:fld>
             <a:endParaRPr kumimoji="1" lang="ja-JP" altLang="en-US"/>
           </a:p>
@@ -1951,7 +1951,7 @@
           <a:p>
             <a:fld id="{2D836C50-4024-0240-9768-AF72A8EA574D}" type="datetimeFigureOut">
               <a:rPr kumimoji="1" lang="ja-JP" altLang="en-US" smtClean="0"/>
-              <a:t>2016/5/13</a:t>
+              <a:t>2016/5/14</a:t>
             </a:fld>
             <a:endParaRPr kumimoji="1" lang="ja-JP" altLang="en-US"/>
           </a:p>
@@ -2197,7 +2197,7 @@
           <a:p>
             <a:fld id="{2D836C50-4024-0240-9768-AF72A8EA574D}" type="datetimeFigureOut">
               <a:rPr kumimoji="1" lang="ja-JP" altLang="en-US" smtClean="0"/>
-              <a:t>2016/5/13</a:t>
+              <a:t>2016/5/14</a:t>
             </a:fld>
             <a:endParaRPr kumimoji="1" lang="ja-JP" altLang="en-US"/>
           </a:p>
@@ -2493,7 +2493,7 @@
           <a:p>
             <a:fld id="{2D836C50-4024-0240-9768-AF72A8EA574D}" type="datetimeFigureOut">
               <a:rPr kumimoji="1" lang="ja-JP" altLang="en-US" smtClean="0"/>
-              <a:t>2016/5/13</a:t>
+              <a:t>2016/5/14</a:t>
             </a:fld>
             <a:endParaRPr kumimoji="1" lang="ja-JP" altLang="en-US"/>
           </a:p>
@@ -2924,7 +2924,7 @@
           <a:p>
             <a:fld id="{2D836C50-4024-0240-9768-AF72A8EA574D}" type="datetimeFigureOut">
               <a:rPr kumimoji="1" lang="ja-JP" altLang="en-US" smtClean="0"/>
-              <a:t>2016/5/13</a:t>
+              <a:t>2016/5/14</a:t>
             </a:fld>
             <a:endParaRPr kumimoji="1" lang="ja-JP" altLang="en-US"/>
           </a:p>
@@ -3042,7 +3042,7 @@
           <a:p>
             <a:fld id="{2D836C50-4024-0240-9768-AF72A8EA574D}" type="datetimeFigureOut">
               <a:rPr kumimoji="1" lang="ja-JP" altLang="en-US" smtClean="0"/>
-              <a:t>2016/5/13</a:t>
+              <a:t>2016/5/14</a:t>
             </a:fld>
             <a:endParaRPr kumimoji="1" lang="ja-JP" altLang="en-US"/>
           </a:p>
@@ -3137,7 +3137,7 @@
           <a:p>
             <a:fld id="{2D836C50-4024-0240-9768-AF72A8EA574D}" type="datetimeFigureOut">
               <a:rPr kumimoji="1" lang="ja-JP" altLang="en-US" smtClean="0"/>
-              <a:t>2016/5/13</a:t>
+              <a:t>2016/5/14</a:t>
             </a:fld>
             <a:endParaRPr kumimoji="1" lang="ja-JP" altLang="en-US"/>
           </a:p>
@@ -3446,7 +3446,7 @@
           <a:p>
             <a:fld id="{2D836C50-4024-0240-9768-AF72A8EA574D}" type="datetimeFigureOut">
               <a:rPr kumimoji="1" lang="ja-JP" altLang="en-US" smtClean="0"/>
-              <a:t>2016/5/13</a:t>
+              <a:t>2016/5/14</a:t>
             </a:fld>
             <a:endParaRPr kumimoji="1" lang="ja-JP" altLang="en-US"/>
           </a:p>
@@ -3699,7 +3699,7 @@
           <a:p>
             <a:fld id="{2D836C50-4024-0240-9768-AF72A8EA574D}" type="datetimeFigureOut">
               <a:rPr kumimoji="1" lang="ja-JP" altLang="en-US" smtClean="0"/>
-              <a:t>2016/5/13</a:t>
+              <a:t>2016/5/14</a:t>
             </a:fld>
             <a:endParaRPr kumimoji="1" lang="ja-JP" altLang="en-US"/>
           </a:p>
@@ -3944,7 +3944,7 @@
           <a:p>
             <a:fld id="{2D836C50-4024-0240-9768-AF72A8EA574D}" type="datetimeFigureOut">
               <a:rPr kumimoji="1" lang="ja-JP" altLang="en-US" smtClean="0"/>
-              <a:t>2016/5/13</a:t>
+              <a:t>2016/5/14</a:t>
             </a:fld>
             <a:endParaRPr kumimoji="1" lang="ja-JP" altLang="en-US"/>
           </a:p>
@@ -4357,7 +4357,7 @@
         </p:nvSpPr>
         <p:spPr>
           <a:xfrm>
-            <a:off x="4261372" y="2332269"/>
+            <a:off x="4611329" y="2411292"/>
             <a:ext cx="813233" cy="1732218"/>
           </a:xfrm>
           <a:prstGeom prst="rect">
@@ -4414,7 +4414,7 @@
         </p:nvSpPr>
         <p:spPr>
           <a:xfrm rot="5400000">
-            <a:off x="5948766" y="2791763"/>
+            <a:off x="6298723" y="2870786"/>
             <a:ext cx="1732217" cy="813232"/>
           </a:xfrm>
           <a:prstGeom prst="rect">
@@ -4470,7 +4470,7 @@
         </p:nvSpPr>
         <p:spPr>
           <a:xfrm rot="5400000">
-            <a:off x="8095647" y="2791762"/>
+            <a:off x="8445604" y="2870785"/>
             <a:ext cx="1732217" cy="813232"/>
           </a:xfrm>
           <a:prstGeom prst="rect">
@@ -4519,7 +4519,7 @@
         </p:nvSpPr>
         <p:spPr>
           <a:xfrm>
-            <a:off x="1248034" y="2644347"/>
+            <a:off x="288481" y="2723370"/>
             <a:ext cx="1569309" cy="913758"/>
           </a:xfrm>
           <a:prstGeom prst="roundRect">
@@ -4570,7 +4570,7 @@
         </p:nvSpPr>
         <p:spPr>
           <a:xfrm>
-            <a:off x="1584659" y="3804251"/>
+            <a:off x="625106" y="3883274"/>
             <a:ext cx="914400" cy="173737"/>
           </a:xfrm>
           <a:prstGeom prst="flowChartMagneticDisk">
@@ -4623,7 +4623,7 @@
         </p:nvSpPr>
         <p:spPr>
           <a:xfrm rot="5400000">
-            <a:off x="1910764" y="3671305"/>
+            <a:off x="951211" y="3750328"/>
             <a:ext cx="269604" cy="45719"/>
           </a:xfrm>
           <a:prstGeom prst="roundRect">
@@ -4674,7 +4674,7 @@
         </p:nvSpPr>
         <p:spPr>
           <a:xfrm>
-            <a:off x="1532862" y="2101436"/>
+            <a:off x="573309" y="2180459"/>
             <a:ext cx="1071127" cy="461665"/>
           </a:xfrm>
           <a:prstGeom prst="rect">
@@ -4718,7 +4718,7 @@
         </p:nvSpPr>
         <p:spPr>
           <a:xfrm rot="16200000">
-            <a:off x="3110667" y="4240644"/>
+            <a:off x="3302579" y="4319667"/>
             <a:ext cx="914400" cy="1387011"/>
           </a:xfrm>
           <a:prstGeom prst="rect">
@@ -4727,9 +4727,9 @@
           <a:solidFill>
             <a:srgbClr val="D99897"/>
           </a:solidFill>
-          <a:ln>
+          <a:ln w="76200">
             <a:solidFill>
-              <a:srgbClr val="D99897"/>
+              <a:srgbClr val="FF0000"/>
             </a:solidFill>
           </a:ln>
         </p:spPr>
@@ -4775,7 +4775,7 @@
         </p:nvSpPr>
         <p:spPr>
           <a:xfrm rot="16200000">
-            <a:off x="3609737" y="319085"/>
+            <a:off x="4433832" y="398108"/>
             <a:ext cx="1082961" cy="1977027"/>
           </a:xfrm>
           <a:prstGeom prst="rect">
@@ -4784,9 +4784,9 @@
           <a:solidFill>
             <a:srgbClr val="92D050"/>
           </a:solidFill>
-          <a:ln>
+          <a:ln w="76200">
             <a:solidFill>
-              <a:srgbClr val="92D050"/>
+              <a:srgbClr val="FF0000"/>
             </a:solidFill>
           </a:ln>
         </p:spPr>
@@ -4839,7 +4839,7 @@
         </p:nvSpPr>
         <p:spPr>
           <a:xfrm rot="16200000">
-            <a:off x="7467648" y="2083906"/>
+            <a:off x="7817605" y="2162929"/>
             <a:ext cx="914400" cy="5700487"/>
           </a:xfrm>
           <a:prstGeom prst="rect">
@@ -4848,9 +4848,9 @@
           <a:solidFill>
             <a:srgbClr val="92D050"/>
           </a:solidFill>
-          <a:ln>
+          <a:ln w="76200">
             <a:solidFill>
-              <a:srgbClr val="92D050"/>
+              <a:srgbClr val="FF0000"/>
             </a:solidFill>
           </a:ln>
         </p:spPr>
@@ -4897,7 +4897,7 @@
         </p:nvCxnSpPr>
         <p:spPr>
           <a:xfrm flipV="1">
-            <a:off x="3608496" y="3299257"/>
+            <a:off x="3800407" y="3378280"/>
             <a:ext cx="0" cy="1177692"/>
           </a:xfrm>
           <a:prstGeom prst="straightConnector1">
@@ -4933,17 +4933,20 @@
         <p:nvCxnSpPr>
           <p:cNvPr id="40" name="直線矢印コネクタ 39"/>
           <p:cNvCxnSpPr>
-            <a:stCxn id="34" idx="2"/>
+            <a:stCxn id="34" idx="1"/>
+            <a:endCxn id="39" idx="2"/>
           </p:cNvCxnSpPr>
           <p:nvPr/>
         </p:nvCxnSpPr>
         <p:spPr>
-          <a:xfrm>
-            <a:off x="5139731" y="1307598"/>
-            <a:ext cx="575392" cy="1793627"/>
-          </a:xfrm>
-          <a:prstGeom prst="bentConnector2">
-            <a:avLst/>
+          <a:xfrm rot="16200000" flipH="1">
+            <a:off x="4895283" y="2008131"/>
+            <a:ext cx="1249121" cy="1089061"/>
+          </a:xfrm>
+          <a:prstGeom prst="bentConnector3">
+            <a:avLst>
+              <a:gd name="adj1" fmla="val 30117"/>
+            </a:avLst>
           </a:prstGeom>
           <a:ln w="25400">
             <a:solidFill>
@@ -4979,7 +4982,7 @@
         </p:nvCxnSpPr>
         <p:spPr>
           <a:xfrm flipH="1" flipV="1">
-            <a:off x="5715123" y="3276443"/>
+            <a:off x="6065080" y="3355466"/>
             <a:ext cx="0" cy="1200506"/>
           </a:xfrm>
           <a:prstGeom prst="straightConnector1">
@@ -5019,7 +5022,7 @@
         </p:nvCxnSpPr>
         <p:spPr>
           <a:xfrm flipH="1" flipV="1">
-            <a:off x="7900230" y="3276443"/>
+            <a:off x="8250187" y="3355466"/>
             <a:ext cx="0" cy="1200506"/>
           </a:xfrm>
           <a:prstGeom prst="straightConnector1">
@@ -5059,7 +5062,7 @@
         </p:nvSpPr>
         <p:spPr>
           <a:xfrm rot="5400000">
-            <a:off x="10218697" y="2791763"/>
+            <a:off x="10568654" y="2870786"/>
             <a:ext cx="1732217" cy="813232"/>
           </a:xfrm>
           <a:prstGeom prst="rect">
@@ -5108,7 +5111,7 @@
         </p:nvCxnSpPr>
         <p:spPr>
           <a:xfrm flipH="1" flipV="1">
-            <a:off x="9980284" y="3276443"/>
+            <a:off x="10330241" y="3355466"/>
             <a:ext cx="0" cy="1200506"/>
           </a:xfrm>
           <a:prstGeom prst="straightConnector1">
@@ -5148,7 +5151,7 @@
         </p:nvSpPr>
         <p:spPr>
           <a:xfrm rot="16200000">
-            <a:off x="6909865" y="319085"/>
+            <a:off x="6616349" y="398108"/>
             <a:ext cx="1082961" cy="1977027"/>
           </a:xfrm>
           <a:prstGeom prst="rect">
@@ -5157,9 +5160,9 @@
           <a:solidFill>
             <a:srgbClr val="92D050"/>
           </a:solidFill>
-          <a:ln>
+          <a:ln w="76200">
             <a:solidFill>
-              <a:srgbClr val="92D050"/>
+              <a:srgbClr val="FF0000"/>
             </a:solidFill>
           </a:ln>
         </p:spPr>
@@ -5198,17 +5201,20 @@
         <p:nvCxnSpPr>
           <p:cNvPr id="37" name="直線矢印コネクタ 39"/>
           <p:cNvCxnSpPr>
-            <a:stCxn id="26" idx="0"/>
+            <a:stCxn id="26" idx="1"/>
+            <a:endCxn id="39" idx="2"/>
           </p:cNvCxnSpPr>
           <p:nvPr/>
         </p:nvCxnSpPr>
         <p:spPr>
-          <a:xfrm rot="10800000" flipV="1">
-            <a:off x="5707514" y="1307597"/>
-            <a:ext cx="755319" cy="1793627"/>
-          </a:xfrm>
-          <a:prstGeom prst="bentConnector2">
-            <a:avLst/>
+          <a:xfrm rot="5400000">
+            <a:off x="5986542" y="2005934"/>
+            <a:ext cx="1249121" cy="1093456"/>
+          </a:xfrm>
+          <a:prstGeom prst="bentConnector3">
+            <a:avLst>
+              <a:gd name="adj1" fmla="val 30117"/>
+            </a:avLst>
           </a:prstGeom>
           <a:ln w="25400">
             <a:solidFill>
@@ -5244,8 +5250,8 @@
         </p:nvSpPr>
         <p:spPr>
           <a:xfrm rot="5400000">
-            <a:off x="3360993" y="2583333"/>
-            <a:ext cx="404949" cy="1216152"/>
+            <a:off x="3040406" y="1991815"/>
+            <a:ext cx="404949" cy="2557235"/>
           </a:xfrm>
           <a:prstGeom prst="upDownArrow">
             <a:avLst/>
@@ -5298,7 +5304,7 @@
         </p:nvSpPr>
         <p:spPr>
           <a:xfrm rot="5400000">
-            <a:off x="5511942" y="2591361"/>
+            <a:off x="5861899" y="2670384"/>
             <a:ext cx="404949" cy="1216152"/>
           </a:xfrm>
           <a:prstGeom prst="upDownArrow">
@@ -5352,7 +5358,7 @@
         </p:nvSpPr>
         <p:spPr>
           <a:xfrm rot="5400000">
-            <a:off x="7672777" y="2568432"/>
+            <a:off x="8022734" y="2647455"/>
             <a:ext cx="404949" cy="1216152"/>
           </a:xfrm>
           <a:prstGeom prst="upDownArrow">
@@ -5406,7 +5412,7 @@
         </p:nvSpPr>
         <p:spPr>
           <a:xfrm rot="5400000">
-            <a:off x="9812198" y="2577198"/>
+            <a:off x="10162155" y="2656221"/>
             <a:ext cx="404949" cy="1216152"/>
           </a:xfrm>
           <a:prstGeom prst="upDownArrow">
@@ -5449,6 +5455,315 @@
           <a:p>
             <a:pPr algn="ctr"/>
             <a:endParaRPr kumimoji="1" lang="ja-JP" altLang="en-US"/>
+          </a:p>
+        </p:txBody>
+      </p:sp>
+      <p:sp>
+        <p:nvSpPr>
+          <p:cNvPr id="28" name="正方形/長方形 27"/>
+          <p:cNvSpPr/>
+          <p:nvPr/>
+        </p:nvSpPr>
+        <p:spPr>
+          <a:xfrm rot="16200000">
+            <a:off x="1981589" y="116615"/>
+            <a:ext cx="1082961" cy="2540010"/>
+          </a:xfrm>
+          <a:prstGeom prst="rect">
+            <a:avLst/>
+          </a:prstGeom>
+          <a:solidFill>
+            <a:srgbClr val="D99897"/>
+          </a:solidFill>
+          <a:ln w="76200">
+            <a:solidFill>
+              <a:srgbClr val="FF0000"/>
+            </a:solidFill>
+          </a:ln>
+        </p:spPr>
+        <p:style>
+          <a:lnRef idx="1">
+            <a:schemeClr val="accent6"/>
+          </a:lnRef>
+          <a:fillRef idx="2">
+            <a:schemeClr val="accent6"/>
+          </a:fillRef>
+          <a:effectRef idx="1">
+            <a:schemeClr val="accent6"/>
+          </a:effectRef>
+          <a:fontRef idx="minor">
+            <a:schemeClr val="dk1"/>
+          </a:fontRef>
+        </p:style>
+        <p:txBody>
+          <a:bodyPr vert="vert" rtlCol="0" anchor="ctr"/>
+          <a:lstStyle/>
+          <a:p>
+            <a:pPr algn="ctr"/>
+            <a:r>
+              <a:rPr kumimoji="1" lang="en-US" altLang="ja-JP" sz="1200" b="1" dirty="0" smtClean="0"/>
+              <a:t>&lt;interface&gt;</a:t>
+            </a:r>
+          </a:p>
+          <a:p>
+            <a:pPr algn="ctr"/>
+            <a:r>
+              <a:rPr lang="en-US" altLang="ja-JP" sz="2400" b="1" dirty="0" err="1"/>
+              <a:t>ServletRequestListener</a:t>
+            </a:r>
+            <a:endParaRPr kumimoji="1" lang="ja-JP" altLang="en-US" sz="2400" b="1" dirty="0"/>
+          </a:p>
+        </p:txBody>
+      </p:sp>
+      <p:cxnSp>
+        <p:nvCxnSpPr>
+          <p:cNvPr id="29" name="直線矢印コネクタ 28"/>
+          <p:cNvCxnSpPr>
+            <a:stCxn id="28" idx="1"/>
+          </p:cNvCxnSpPr>
+          <p:nvPr/>
+        </p:nvCxnSpPr>
+        <p:spPr>
+          <a:xfrm>
+            <a:off x="2523070" y="1928101"/>
+            <a:ext cx="5639" cy="1249121"/>
+          </a:xfrm>
+          <a:prstGeom prst="straightConnector1">
+            <a:avLst/>
+          </a:prstGeom>
+          <a:ln w="25400">
+            <a:solidFill>
+              <a:schemeClr val="tx1">
+                <a:lumMod val="50000"/>
+                <a:lumOff val="50000"/>
+              </a:schemeClr>
+            </a:solidFill>
+            <a:prstDash val="dash"/>
+            <a:tailEnd type="arrow"/>
+          </a:ln>
+        </p:spPr>
+        <p:style>
+          <a:lnRef idx="1">
+            <a:schemeClr val="accent1"/>
+          </a:lnRef>
+          <a:fillRef idx="0">
+            <a:schemeClr val="accent1"/>
+          </a:fillRef>
+          <a:effectRef idx="0">
+            <a:schemeClr val="accent1"/>
+          </a:effectRef>
+          <a:fontRef idx="minor">
+            <a:schemeClr val="tx1"/>
+          </a:fontRef>
+        </p:style>
+      </p:cxnSp>
+      <p:sp>
+        <p:nvSpPr>
+          <p:cNvPr id="43" name="テキスト ボックス 42"/>
+          <p:cNvSpPr txBox="1"/>
+          <p:nvPr/>
+        </p:nvSpPr>
+        <p:spPr>
+          <a:xfrm>
+            <a:off x="3857853" y="3586387"/>
+            <a:ext cx="415498" cy="369332"/>
+          </a:xfrm>
+          <a:prstGeom prst="rect">
+            <a:avLst/>
+          </a:prstGeom>
+          <a:noFill/>
+        </p:spPr>
+        <p:txBody>
+          <a:bodyPr wrap="none" rtlCol="0">
+            <a:spAutoFit/>
+          </a:bodyPr>
+          <a:lstStyle/>
+          <a:p>
+            <a:r>
+              <a:rPr lang="ja-JP" altLang="en-US" dirty="0" smtClean="0"/>
+              <a:t>②</a:t>
+            </a:r>
+            <a:endParaRPr kumimoji="1" lang="ja-JP" altLang="en-US" dirty="0"/>
+          </a:p>
+        </p:txBody>
+      </p:sp>
+      <p:sp>
+        <p:nvSpPr>
+          <p:cNvPr id="44" name="テキスト ボックス 43"/>
+          <p:cNvSpPr txBox="1"/>
+          <p:nvPr/>
+        </p:nvSpPr>
+        <p:spPr>
+          <a:xfrm>
+            <a:off x="2712770" y="2520395"/>
+            <a:ext cx="415498" cy="369332"/>
+          </a:xfrm>
+          <a:prstGeom prst="rect">
+            <a:avLst/>
+          </a:prstGeom>
+          <a:noFill/>
+        </p:spPr>
+        <p:txBody>
+          <a:bodyPr wrap="none" rtlCol="0">
+            <a:spAutoFit/>
+          </a:bodyPr>
+          <a:lstStyle/>
+          <a:p>
+            <a:r>
+              <a:rPr lang="ja-JP" altLang="en-US" dirty="0" smtClean="0"/>
+              <a:t>①</a:t>
+            </a:r>
+            <a:endParaRPr kumimoji="1" lang="ja-JP" altLang="en-US" dirty="0"/>
+          </a:p>
+        </p:txBody>
+      </p:sp>
+      <p:sp>
+        <p:nvSpPr>
+          <p:cNvPr id="45" name="テキスト ボックス 44"/>
+          <p:cNvSpPr txBox="1"/>
+          <p:nvPr/>
+        </p:nvSpPr>
+        <p:spPr>
+          <a:xfrm>
+            <a:off x="5300446" y="1968070"/>
+            <a:ext cx="415498" cy="369332"/>
+          </a:xfrm>
+          <a:prstGeom prst="rect">
+            <a:avLst/>
+          </a:prstGeom>
+          <a:noFill/>
+        </p:spPr>
+        <p:txBody>
+          <a:bodyPr wrap="none" rtlCol="0">
+            <a:spAutoFit/>
+          </a:bodyPr>
+          <a:lstStyle/>
+          <a:p>
+            <a:r>
+              <a:rPr kumimoji="1" lang="ja-JP" altLang="en-US" dirty="0" smtClean="0"/>
+              <a:t>③</a:t>
+            </a:r>
+            <a:endParaRPr kumimoji="1" lang="ja-JP" altLang="en-US" dirty="0"/>
+          </a:p>
+        </p:txBody>
+      </p:sp>
+      <p:sp>
+        <p:nvSpPr>
+          <p:cNvPr id="46" name="テキスト ボックス 45"/>
+          <p:cNvSpPr txBox="1"/>
+          <p:nvPr/>
+        </p:nvSpPr>
+        <p:spPr>
+          <a:xfrm>
+            <a:off x="6337609" y="1964625"/>
+            <a:ext cx="415498" cy="369332"/>
+          </a:xfrm>
+          <a:prstGeom prst="rect">
+            <a:avLst/>
+          </a:prstGeom>
+          <a:noFill/>
+        </p:spPr>
+        <p:txBody>
+          <a:bodyPr wrap="none" rtlCol="0">
+            <a:spAutoFit/>
+          </a:bodyPr>
+          <a:lstStyle/>
+          <a:p>
+            <a:r>
+              <a:rPr lang="ja-JP" altLang="en-US" dirty="0" smtClean="0"/>
+              <a:t>④</a:t>
+            </a:r>
+            <a:endParaRPr kumimoji="1" lang="ja-JP" altLang="en-US" dirty="0"/>
+          </a:p>
+        </p:txBody>
+      </p:sp>
+      <p:sp>
+        <p:nvSpPr>
+          <p:cNvPr id="47" name="テキスト ボックス 46"/>
+          <p:cNvSpPr txBox="1"/>
+          <p:nvPr/>
+        </p:nvSpPr>
+        <p:spPr>
+          <a:xfrm>
+            <a:off x="6146303" y="3538658"/>
+            <a:ext cx="415498" cy="369332"/>
+          </a:xfrm>
+          <a:prstGeom prst="rect">
+            <a:avLst/>
+          </a:prstGeom>
+          <a:noFill/>
+        </p:spPr>
+        <p:txBody>
+          <a:bodyPr wrap="none" rtlCol="0">
+            <a:spAutoFit/>
+          </a:bodyPr>
+          <a:lstStyle/>
+          <a:p>
+            <a:r>
+              <a:rPr kumimoji="1" lang="ja-JP" altLang="en-US" dirty="0" smtClean="0"/>
+              <a:t>⑤</a:t>
+            </a:r>
+            <a:endParaRPr kumimoji="1" lang="ja-JP" altLang="en-US" dirty="0"/>
+          </a:p>
+        </p:txBody>
+      </p:sp>
+      <p:sp>
+        <p:nvSpPr>
+          <p:cNvPr id="48" name="テキスト ボックス 47"/>
+          <p:cNvSpPr txBox="1"/>
+          <p:nvPr/>
+        </p:nvSpPr>
+        <p:spPr>
+          <a:xfrm>
+            <a:off x="10364629" y="3540764"/>
+            <a:ext cx="415498" cy="369332"/>
+          </a:xfrm>
+          <a:prstGeom prst="rect">
+            <a:avLst/>
+          </a:prstGeom>
+          <a:noFill/>
+        </p:spPr>
+        <p:txBody>
+          <a:bodyPr wrap="none" rtlCol="0">
+            <a:spAutoFit/>
+          </a:bodyPr>
+          <a:lstStyle/>
+          <a:p>
+            <a:r>
+              <a:rPr lang="ja-JP" altLang="en-US" dirty="0" smtClean="0"/>
+              <a:t>⑦</a:t>
+            </a:r>
+            <a:endParaRPr kumimoji="1" lang="ja-JP" altLang="en-US" dirty="0"/>
+          </a:p>
+        </p:txBody>
+      </p:sp>
+      <p:sp>
+        <p:nvSpPr>
+          <p:cNvPr id="49" name="テキスト ボックス 48"/>
+          <p:cNvSpPr txBox="1"/>
+          <p:nvPr/>
+        </p:nvSpPr>
+        <p:spPr>
+          <a:xfrm>
+            <a:off x="8260650" y="3538658"/>
+            <a:ext cx="415498" cy="369332"/>
+          </a:xfrm>
+          <a:prstGeom prst="rect">
+            <a:avLst/>
+          </a:prstGeom>
+          <a:noFill/>
+        </p:spPr>
+        <p:txBody>
+          <a:bodyPr wrap="none" rtlCol="0">
+            <a:spAutoFit/>
+          </a:bodyPr>
+          <a:lstStyle/>
+          <a:p>
+            <a:r>
+              <a:rPr lang="ja-JP" altLang="en-US" dirty="0" smtClean="0"/>
+              <a:t>⑥</a:t>
+            </a:r>
+            <a:endParaRPr kumimoji="1" lang="ja-JP" altLang="en-US" dirty="0"/>
           </a:p>
         </p:txBody>
       </p:sp>
@@ -8607,15 +8922,7 @@
                   <a:srgbClr val="D99897"/>
                 </a:solidFill>
               </a:rPr>
-              <a:t>AOP </a:t>
-            </a:r>
-            <a:r>
-              <a:rPr kumimoji="1" lang="en-US" altLang="ja-JP" sz="2800" b="1" dirty="0" smtClean="0">
-                <a:solidFill>
-                  <a:srgbClr val="D99897"/>
-                </a:solidFill>
-              </a:rPr>
-              <a:t>Proxy</a:t>
+              <a:t>AOP Proxy</a:t>
             </a:r>
             <a:endParaRPr kumimoji="1" lang="ja-JP" altLang="en-US" sz="2800" b="1" dirty="0">
               <a:solidFill>
@@ -9075,14 +9382,6 @@
               </a:rPr>
               <a:t>(Caller)</a:t>
             </a:r>
-            <a:endParaRPr kumimoji="1" lang="en-US" altLang="ja-JP" sz="2400" dirty="0" smtClean="0">
-              <a:solidFill>
-                <a:schemeClr val="tx1">
-                  <a:lumMod val="50000"/>
-                  <a:lumOff val="50000"/>
-                </a:schemeClr>
-              </a:solidFill>
-            </a:endParaRPr>
           </a:p>
         </p:txBody>
       </p:sp>

</xml_diff>